<commit_message>
update lesson 1 slides
</commit_message>
<xml_diff>
--- a/slides/01---Reproducible-Research.pptx
+++ b/slides/01---Reproducible-Research.pptx
@@ -331,7 +331,7 @@
           <a:p>
             <a:fld id="{241EB5C9-1307-BA42-ABA2-0BC069CD8E7F}" type="datetimeFigureOut">
               <a:rPr lang="en-US" smtClean="0"/>
-              <a:t>2/23/21</a:t>
+              <a:t>4/9/22</a:t>
             </a:fld>
             <a:endParaRPr lang="en-US"/>
           </a:p>
@@ -499,7 +499,7 @@
           <a:p>
             <a:fld id="{241EB5C9-1307-BA42-ABA2-0BC069CD8E7F}" type="datetimeFigureOut">
               <a:rPr lang="en-US" smtClean="0"/>
-              <a:t>2/23/21</a:t>
+              <a:t>4/9/22</a:t>
             </a:fld>
             <a:endParaRPr lang="en-US"/>
           </a:p>
@@ -677,7 +677,7 @@
           <a:p>
             <a:fld id="{241EB5C9-1307-BA42-ABA2-0BC069CD8E7F}" type="datetimeFigureOut">
               <a:rPr lang="en-US" smtClean="0"/>
-              <a:t>2/23/21</a:t>
+              <a:t>4/9/22</a:t>
             </a:fld>
             <a:endParaRPr lang="en-US"/>
           </a:p>
@@ -845,7 +845,7 @@
           <a:p>
             <a:fld id="{241EB5C9-1307-BA42-ABA2-0BC069CD8E7F}" type="datetimeFigureOut">
               <a:rPr lang="en-US" smtClean="0"/>
-              <a:t>2/23/21</a:t>
+              <a:t>4/9/22</a:t>
             </a:fld>
             <a:endParaRPr lang="en-US"/>
           </a:p>
@@ -1090,7 +1090,7 @@
           <a:p>
             <a:fld id="{241EB5C9-1307-BA42-ABA2-0BC069CD8E7F}" type="datetimeFigureOut">
               <a:rPr lang="en-US" smtClean="0"/>
-              <a:t>2/23/21</a:t>
+              <a:t>4/9/22</a:t>
             </a:fld>
             <a:endParaRPr lang="en-US"/>
           </a:p>
@@ -1375,7 +1375,7 @@
           <a:p>
             <a:fld id="{241EB5C9-1307-BA42-ABA2-0BC069CD8E7F}" type="datetimeFigureOut">
               <a:rPr lang="en-US" smtClean="0"/>
-              <a:t>2/23/21</a:t>
+              <a:t>4/9/22</a:t>
             </a:fld>
             <a:endParaRPr lang="en-US"/>
           </a:p>
@@ -1794,7 +1794,7 @@
           <a:p>
             <a:fld id="{241EB5C9-1307-BA42-ABA2-0BC069CD8E7F}" type="datetimeFigureOut">
               <a:rPr lang="en-US" smtClean="0"/>
-              <a:t>2/23/21</a:t>
+              <a:t>4/9/22</a:t>
             </a:fld>
             <a:endParaRPr lang="en-US"/>
           </a:p>
@@ -1911,7 +1911,7 @@
           <a:p>
             <a:fld id="{241EB5C9-1307-BA42-ABA2-0BC069CD8E7F}" type="datetimeFigureOut">
               <a:rPr lang="en-US" smtClean="0"/>
-              <a:t>2/23/21</a:t>
+              <a:t>4/9/22</a:t>
             </a:fld>
             <a:endParaRPr lang="en-US"/>
           </a:p>
@@ -2006,7 +2006,7 @@
           <a:p>
             <a:fld id="{241EB5C9-1307-BA42-ABA2-0BC069CD8E7F}" type="datetimeFigureOut">
               <a:rPr lang="en-US" smtClean="0"/>
-              <a:t>2/23/21</a:t>
+              <a:t>4/9/22</a:t>
             </a:fld>
             <a:endParaRPr lang="en-US"/>
           </a:p>
@@ -2281,7 +2281,7 @@
           <a:p>
             <a:fld id="{241EB5C9-1307-BA42-ABA2-0BC069CD8E7F}" type="datetimeFigureOut">
               <a:rPr lang="en-US" smtClean="0"/>
-              <a:t>2/23/21</a:t>
+              <a:t>4/9/22</a:t>
             </a:fld>
             <a:endParaRPr lang="en-US"/>
           </a:p>
@@ -2533,7 +2533,7 @@
           <a:p>
             <a:fld id="{241EB5C9-1307-BA42-ABA2-0BC069CD8E7F}" type="datetimeFigureOut">
               <a:rPr lang="en-US" smtClean="0"/>
-              <a:t>2/23/21</a:t>
+              <a:t>4/9/22</a:t>
             </a:fld>
             <a:endParaRPr lang="en-US"/>
           </a:p>
@@ -2744,7 +2744,7 @@
           <a:p>
             <a:fld id="{241EB5C9-1307-BA42-ABA2-0BC069CD8E7F}" type="datetimeFigureOut">
               <a:rPr lang="en-US" smtClean="0"/>
-              <a:t>2/23/21</a:t>
+              <a:t>4/9/22</a:t>
             </a:fld>
             <a:endParaRPr lang="en-US"/>
           </a:p>
@@ -5024,7 +5024,15 @@
             </a:pPr>
             <a:r>
               <a:rPr dirty="0"/>
-              <a:t>In the Directory Name prompt under Create New Project, enter “msacl-201-project”</a:t>
+              <a:t>In the Directory Name prompt under Create New Project, enter “</a:t>
+            </a:r>
+            <a:r>
+              <a:rPr lang="en-US" dirty="0"/>
+              <a:t>sample-project-structure</a:t>
+            </a:r>
+            <a:r>
+              <a:rPr dirty="0"/>
+              <a:t>”</a:t>
             </a:r>
           </a:p>
           <a:p>

</xml_diff>